<commit_message>
Ajout de la video du  presentation
</commit_message>
<xml_diff>
--- a/Projet Data Science Powerpoint.pptx
+++ b/Projet Data Science Powerpoint.pptx
@@ -33,10 +33,13 @@
     <p:embeddedFont>
       <p:font typeface="Montserrat" panose="00000500000000000000" pitchFamily="2" charset="0"/>
       <p:regular r:id="rId14"/>
+      <p:bold r:id="rId15"/>
+      <p:italic r:id="rId16"/>
+      <p:boldItalic r:id="rId17"/>
     </p:embeddedFont>
     <p:embeddedFont>
       <p:font typeface="Montserrat Bold" panose="00000800000000000000" charset="0"/>
-      <p:regular r:id="rId15"/>
+      <p:regular r:id="rId18"/>
     </p:embeddedFont>
   </p:embeddedFontLst>
   <p:defaultTextStyle>
@@ -6005,14 +6008,14 @@
         <p:spPr>
           <a:xfrm>
             <a:off x="2954934" y="3817974"/>
-            <a:ext cx="6213954" cy="580849"/>
+            <a:ext cx="7179666" cy="589905"/>
           </a:xfrm>
           <a:prstGeom prst="rect">
             <a:avLst/>
           </a:prstGeom>
         </p:spPr>
         <p:txBody>
-          <a:bodyPr lIns="0" tIns="0" rIns="0" bIns="0" rtlCol="0" anchor="t">
+          <a:bodyPr wrap="square" lIns="0" tIns="0" rIns="0" bIns="0" rtlCol="0" anchor="t">
             <a:spAutoFit/>
           </a:bodyPr>
           <a:lstStyle/>
@@ -6026,7 +6029,7 @@
               </a:spcBef>
             </a:pPr>
             <a:r>
-              <a:rPr lang="en-US" sz="4045" b="1">
+              <a:rPr lang="en-US" sz="4045" b="1" dirty="0" err="1">
                 <a:solidFill>
                   <a:srgbClr val="000000"/>
                 </a:solidFill>
@@ -6038,7 +6041,7 @@
               <a:t>Statistiques</a:t>
             </a:r>
             <a:r>
-              <a:rPr lang="en-US" sz="4045" b="1" u="none" strike="noStrike">
+              <a:rPr lang="en-US" sz="4045" b="1" u="none" strike="noStrike" dirty="0">
                 <a:solidFill>
                   <a:srgbClr val="000000"/>
                 </a:solidFill>
@@ -6126,14 +6129,14 @@
         <p:spPr>
           <a:xfrm>
             <a:off x="7829349" y="8503939"/>
-            <a:ext cx="6130209" cy="579894"/>
+            <a:ext cx="7410651" cy="589905"/>
           </a:xfrm>
           <a:prstGeom prst="rect">
             <a:avLst/>
           </a:prstGeom>
         </p:spPr>
         <p:txBody>
-          <a:bodyPr lIns="0" tIns="0" rIns="0" bIns="0" rtlCol="0" anchor="t">
+          <a:bodyPr wrap="square" lIns="0" tIns="0" rIns="0" bIns="0" rtlCol="0" anchor="t">
             <a:spAutoFit/>
           </a:bodyPr>
           <a:lstStyle/>
@@ -6147,7 +6150,7 @@
               </a:spcBef>
             </a:pPr>
             <a:r>
-              <a:rPr lang="en-US" sz="4045" b="1">
+              <a:rPr lang="en-US" sz="4045" b="1" dirty="0" err="1">
                 <a:solidFill>
                   <a:srgbClr val="000000"/>
                 </a:solidFill>
@@ -6159,7 +6162,7 @@
               <a:t>Déséquilibre</a:t>
             </a:r>
             <a:r>
-              <a:rPr lang="en-US" sz="4045" b="1" u="none" strike="noStrike">
+              <a:rPr lang="en-US" sz="4045" b="1" u="none" strike="noStrike" dirty="0">
                 <a:solidFill>
                   <a:srgbClr val="000000"/>
                 </a:solidFill>
@@ -6182,14 +6185,14 @@
         <p:spPr>
           <a:xfrm>
             <a:off x="3393728" y="6821062"/>
-            <a:ext cx="5006814" cy="580849"/>
+            <a:ext cx="6130208" cy="589905"/>
           </a:xfrm>
           <a:prstGeom prst="rect">
             <a:avLst/>
           </a:prstGeom>
         </p:spPr>
         <p:txBody>
-          <a:bodyPr lIns="0" tIns="0" rIns="0" bIns="0" rtlCol="0" anchor="t">
+          <a:bodyPr wrap="square" lIns="0" tIns="0" rIns="0" bIns="0" rtlCol="0" anchor="t">
             <a:spAutoFit/>
           </a:bodyPr>
           <a:lstStyle/>
@@ -6203,7 +6206,7 @@
               </a:spcBef>
             </a:pPr>
             <a:r>
-              <a:rPr lang="en-US" sz="4045" b="1">
+              <a:rPr lang="en-US" sz="4045" b="1" dirty="0" err="1">
                 <a:solidFill>
                   <a:srgbClr val="000000"/>
                 </a:solidFill>
@@ -6215,7 +6218,7 @@
               <a:t>Détection</a:t>
             </a:r>
             <a:r>
-              <a:rPr lang="en-US" sz="4045" b="1" u="none" strike="noStrike">
+              <a:rPr lang="en-US" sz="4045" b="1" u="none" strike="noStrike" dirty="0">
                 <a:solidFill>
                   <a:srgbClr val="000000"/>
                 </a:solidFill>
@@ -6224,8 +6227,29 @@
                 <a:cs typeface="Canva Sans Bold"/>
                 <a:sym typeface="Canva Sans Bold"/>
               </a:rPr>
-              <a:t> d’outliers</a:t>
-            </a:r>
+              <a:t> </a:t>
+            </a:r>
+            <a:r>
+              <a:rPr lang="en-US" sz="4045" b="1" u="none" strike="noStrike" dirty="0" err="1">
+                <a:solidFill>
+                  <a:srgbClr val="000000"/>
+                </a:solidFill>
+                <a:latin typeface="Canva Sans Bold"/>
+                <a:ea typeface="Canva Sans Bold"/>
+                <a:cs typeface="Canva Sans Bold"/>
+                <a:sym typeface="Canva Sans Bold"/>
+              </a:rPr>
+              <a:t>d’outliers</a:t>
+            </a:r>
+            <a:endParaRPr lang="en-US" sz="4045" b="1" u="none" strike="noStrike" dirty="0">
+              <a:solidFill>
+                <a:srgbClr val="000000"/>
+              </a:solidFill>
+              <a:latin typeface="Canva Sans Bold"/>
+              <a:ea typeface="Canva Sans Bold"/>
+              <a:cs typeface="Canva Sans Bold"/>
+              <a:sym typeface="Canva Sans Bold"/>
+            </a:endParaRPr>
           </a:p>
         </p:txBody>
       </p:sp>

</xml_diff>